<commit_message>
changed final report and poster
</commit_message>
<xml_diff>
--- a/Documents/team52_final_poster.pptx
+++ b/Documents/team52_final_poster.pptx
@@ -139,7 +139,7 @@
   </p:defaultTextStyle>
   <p:extLst>
     <p:ext uri="{EFAFB233-063F-42B5-8137-9DF3F51BA10A}">
-      <p15:sldGuideLst xmlns:p15="http://schemas.microsoft.com/office/powerpoint/2012/main" xmlns="">
+      <p15:sldGuideLst xmlns:p15="http://schemas.microsoft.com/office/powerpoint/2012/main">
         <p15:guide id="1" orient="horz" pos="9537">
           <p15:clr>
             <a:srgbClr val="A4A3A4"/>
@@ -251,7 +251,7 @@
               <a:pPr>
                 <a:defRPr/>
               </a:pPr>
-              <a:t>27/03/2015</a:t>
+              <a:t>30/03/2016</a:t>
             </a:fld>
             <a:endParaRPr lang="en-GB"/>
           </a:p>
@@ -2940,7 +2940,7 @@
           <a:p>
             <a:pPr eaLnBrk="1" hangingPunct="1"/>
             <a:r>
-              <a:rPr lang="en-GB" altLang="en-US" sz="11500">
+              <a:rPr lang="en-GB" altLang="en-US" sz="11500" dirty="0" smtClean="0">
                 <a:solidFill>
                   <a:schemeClr val="bg1"/>
                 </a:solidFill>
@@ -2948,7 +2948,7 @@
               <a:t>The Low Birth Weight in South Asia Trial (</a:t>
             </a:r>
             <a:r>
-              <a:rPr lang="en-GB" altLang="en-US" sz="11500" b="1">
+              <a:rPr lang="en-GB" altLang="en-US" sz="11500" b="1" dirty="0" smtClean="0">
                 <a:solidFill>
                   <a:schemeClr val="bg1"/>
                 </a:solidFill>
@@ -2956,14 +2956,14 @@
               <a:t>LBWSAT</a:t>
             </a:r>
             <a:r>
-              <a:rPr lang="en-GB" altLang="en-US" sz="11500">
+              <a:rPr lang="en-GB" altLang="en-US" sz="11500" dirty="0" smtClean="0">
                 <a:solidFill>
                   <a:schemeClr val="bg1"/>
                 </a:solidFill>
               </a:rPr>
               <a:t>)</a:t>
             </a:r>
-            <a:endParaRPr lang="en-GB" altLang="en-US" sz="8000">
+            <a:endParaRPr lang="en-GB" altLang="en-US" sz="8000" dirty="0">
               <a:solidFill>
                 <a:schemeClr val="bg1"/>
               </a:solidFill>
@@ -3142,7 +3142,7 @@
         <p:spPr bwMode="auto">
           <a:xfrm>
             <a:off x="593725" y="4048125"/>
-            <a:ext cx="26214228" cy="1446550"/>
+            <a:ext cx="22783801" cy="1446550"/>
           </a:xfrm>
           <a:prstGeom prst="rect">
             <a:avLst/>
@@ -3284,60 +3284,12 @@
               <a:t>App by </a:t>
             </a:r>
             <a:r>
-              <a:rPr lang="en-GB" altLang="en-US" sz="8800" dirty="0" err="1" smtClean="0">
+              <a:rPr lang="en-GB" altLang="en-US" sz="8800" dirty="0" smtClean="0">
                 <a:solidFill>
                   <a:schemeClr val="bg1"/>
                 </a:solidFill>
               </a:rPr>
-              <a:t>Rohan</a:t>
-            </a:r>
-            <a:r>
-              <a:rPr lang="en-GB" altLang="en-US" sz="8800" dirty="0" smtClean="0">
-                <a:solidFill>
-                  <a:schemeClr val="bg1"/>
-                </a:solidFill>
-              </a:rPr>
-              <a:t> </a:t>
-            </a:r>
-            <a:r>
-              <a:rPr lang="en-GB" altLang="en-US" sz="8800" dirty="0" err="1">
-                <a:solidFill>
-                  <a:schemeClr val="bg1"/>
-                </a:solidFill>
-              </a:rPr>
-              <a:t>Kopparapu</a:t>
-            </a:r>
-            <a:r>
-              <a:rPr lang="en-GB" altLang="en-US" sz="8800" dirty="0">
-                <a:solidFill>
-                  <a:schemeClr val="bg1"/>
-                </a:solidFill>
-              </a:rPr>
-              <a:t> and </a:t>
-            </a:r>
-            <a:r>
-              <a:rPr lang="en-GB" altLang="en-US" sz="8800" dirty="0" err="1">
-                <a:solidFill>
-                  <a:schemeClr val="bg1"/>
-                </a:solidFill>
-              </a:rPr>
-              <a:t>Pranav</a:t>
-            </a:r>
-            <a:r>
-              <a:rPr lang="en-GB" altLang="en-US" sz="8800" dirty="0">
-                <a:solidFill>
-                  <a:schemeClr val="bg1"/>
-                </a:solidFill>
-              </a:rPr>
-              <a:t> </a:t>
-            </a:r>
-            <a:r>
-              <a:rPr lang="en-GB" altLang="en-US" sz="8800" dirty="0" err="1" smtClean="0">
-                <a:solidFill>
-                  <a:schemeClr val="bg1"/>
-                </a:solidFill>
-              </a:rPr>
-              <a:t>Murugappan</a:t>
+              <a:t>Jaromir Latal and Lambros Zannettos</a:t>
             </a:r>
             <a:endParaRPr lang="en-GB" altLang="en-US" sz="6000" dirty="0">
               <a:solidFill>
@@ -3358,7 +3310,7 @@
         <p:spPr bwMode="auto">
           <a:xfrm>
             <a:off x="666750" y="5648325"/>
-            <a:ext cx="30080479" cy="923330"/>
+            <a:ext cx="28362444" cy="923330"/>
           </a:xfrm>
           <a:prstGeom prst="rect">
             <a:avLst/>
@@ -3492,12 +3444,20 @@
           <a:p>
             <a:pPr eaLnBrk="1" hangingPunct="1"/>
             <a:r>
+              <a:rPr lang="en-GB" altLang="en-US" sz="5400" b="1" dirty="0" smtClean="0">
+                <a:solidFill>
+                  <a:schemeClr val="bg1"/>
+                </a:solidFill>
+              </a:rPr>
+              <a:t>jaromir.latal.15@ucl.ac.uk</a:t>
+            </a:r>
+            <a:r>
               <a:rPr lang="en-GB" altLang="en-US" sz="5400" b="1" dirty="0">
                 <a:solidFill>
                   <a:schemeClr val="bg1"/>
                 </a:solidFill>
               </a:rPr>
-              <a:t>rohan.kopparapu.13@ucl.ac.uk,  </a:t>
+              <a:t>,  </a:t>
             </a:r>
             <a:r>
               <a:rPr lang="en-GB" altLang="en-US" sz="5400" b="1" dirty="0" smtClean="0">
@@ -3505,7 +3465,15 @@
                   <a:schemeClr val="bg1"/>
                 </a:solidFill>
               </a:rPr>
-              <a:t>pranav.murugappan.13@ucl.ac.uk </a:t>
+              <a:t>l</a:t>
+            </a:r>
+            <a:r>
+              <a:rPr lang="en-GB" altLang="en-US" sz="5400" b="1" dirty="0" smtClean="0">
+                <a:solidFill>
+                  <a:schemeClr val="bg1"/>
+                </a:solidFill>
+              </a:rPr>
+              <a:t>ambros.zannettos.15@ucl.ac.uk </a:t>
             </a:r>
             <a:r>
               <a:rPr lang="en-GB" altLang="en-US" sz="5400" dirty="0">

</xml_diff>

<commit_message>
finished poster (pre-final version)
</commit_message>
<xml_diff>
--- a/Documents/team52_final_poster.pptx
+++ b/Documents/team52_final_poster.pptx
@@ -251,7 +251,7 @@
               <a:pPr>
                 <a:defRPr/>
               </a:pPr>
-              <a:t>10/04/2016</a:t>
+              <a:t>11/04/2016</a:t>
             </a:fld>
             <a:endParaRPr lang="en-GB"/>
           </a:p>
@@ -3531,8 +3531,8 @@
         </p:nvSpPr>
         <p:spPr bwMode="auto">
           <a:xfrm>
-            <a:off x="593725" y="9019307"/>
-            <a:ext cx="20666521" cy="21482804"/>
+            <a:off x="457201" y="9019307"/>
+            <a:ext cx="20803046" cy="21267360"/>
           </a:xfrm>
           <a:prstGeom prst="rect">
             <a:avLst/>
@@ -3697,7 +3697,15 @@
             </a:pPr>
             <a:r>
               <a:rPr lang="en-GB" altLang="en-US" sz="4600" dirty="0" smtClean="0"/>
-              <a:t>This is associated with numerous health, family or financial complaints.</a:t>
+              <a:t>This is associated with</a:t>
+            </a:r>
+            <a:r>
+              <a:rPr lang="en-GB" altLang="en-US" sz="4600" b="1" dirty="0" smtClean="0"/>
+              <a:t> numerous health, family or financial complaints</a:t>
+            </a:r>
+            <a:r>
+              <a:rPr lang="en-GB" altLang="en-US" sz="4600" dirty="0" smtClean="0"/>
+              <a:t>.</a:t>
             </a:r>
             <a:endParaRPr lang="en-GB" altLang="en-US" sz="4600" dirty="0"/>
           </a:p>
@@ -3718,28 +3726,32 @@
               <a:buChar char="•"/>
             </a:pPr>
             <a:r>
-              <a:rPr lang="en-US" altLang="en-US" sz="4600" dirty="0" smtClean="0"/>
+              <a:rPr lang="en-US" altLang="en-US" sz="4600" b="1" dirty="0" smtClean="0"/>
               <a:t>300 million </a:t>
             </a:r>
             <a:r>
+              <a:rPr lang="en-US" altLang="en-US" sz="4600" b="1" dirty="0"/>
+              <a:t>working </a:t>
+            </a:r>
+            <a:r>
+              <a:rPr lang="en-US" altLang="en-US" sz="4600" b="1" dirty="0" smtClean="0"/>
+              <a:t>days lost </a:t>
+            </a:r>
+            <a:r>
+              <a:rPr lang="en-US" altLang="en-US" sz="4600" b="1" dirty="0"/>
+              <a:t>annually </a:t>
+            </a:r>
+            <a:r>
+              <a:rPr lang="en-US" altLang="en-US" sz="4600" b="1" dirty="0" smtClean="0"/>
+              <a:t>are </a:t>
+            </a:r>
+            <a:r>
+              <a:rPr lang="en-US" altLang="en-US" sz="4600" b="1" dirty="0"/>
+              <a:t>stress related </a:t>
+            </a:r>
+            <a:r>
               <a:rPr lang="en-US" altLang="en-US" sz="4600" dirty="0"/>
-              <a:t>working </a:t>
-            </a:r>
-            <a:r>
-              <a:rPr lang="en-US" altLang="en-US" sz="4600" dirty="0" smtClean="0"/>
-              <a:t>days lost </a:t>
-            </a:r>
-            <a:r>
-              <a:rPr lang="en-US" altLang="en-US" sz="4600" dirty="0"/>
-              <a:t>annually </a:t>
-            </a:r>
-            <a:r>
-              <a:rPr lang="en-US" altLang="en-US" sz="4600" dirty="0" smtClean="0"/>
-              <a:t>are </a:t>
-            </a:r>
-            <a:r>
-              <a:rPr lang="en-US" altLang="en-US" sz="4600" dirty="0"/>
-              <a:t>stress related and </a:t>
+              <a:t>and </a:t>
             </a:r>
             <a:r>
               <a:rPr lang="en-US" altLang="en-US" sz="4600" dirty="0" smtClean="0"/>
@@ -3761,7 +3773,15 @@
             </a:pPr>
             <a:r>
               <a:rPr lang="en-US" altLang="en-US" sz="4600" dirty="0" smtClean="0"/>
-              <a:t>Employers and governments incur losses up to £140 million pounds.</a:t>
+              <a:t>Employers and governments incur </a:t>
+            </a:r>
+            <a:r>
+              <a:rPr lang="en-US" altLang="en-US" sz="4600" b="1" dirty="0" smtClean="0"/>
+              <a:t>losses up to £140 million pounds</a:t>
+            </a:r>
+            <a:r>
+              <a:rPr lang="en-US" altLang="en-US" sz="4600" dirty="0" smtClean="0"/>
+              <a:t>.</a:t>
             </a:r>
           </a:p>
           <a:p>
@@ -3770,17 +3790,74 @@
               <a:buChar char="•"/>
             </a:pPr>
             <a:r>
-              <a:rPr lang="en-GB" altLang="en-US" sz="4600" u="sng" dirty="0" smtClean="0"/>
-              <a:t>The sheer size of the data to be collected is impractical on paper forms, hence an </a:t>
-            </a:r>
-            <a:r>
-              <a:rPr lang="en-GB" altLang="en-US" sz="4600" b="1" u="sng" dirty="0" smtClean="0"/>
-              <a:t>app for tablets </a:t>
-            </a:r>
-            <a:r>
-              <a:rPr lang="en-GB" altLang="en-US" sz="4600" u="sng" dirty="0" smtClean="0"/>
-              <a:t>was designed.</a:t>
-            </a:r>
+              <a:rPr lang="en-GB" altLang="en-US" sz="4600" b="1" dirty="0" smtClean="0"/>
+              <a:t>Meditation </a:t>
+            </a:r>
+            <a:r>
+              <a:rPr lang="en-GB" altLang="en-US" sz="4600" dirty="0" smtClean="0"/>
+              <a:t>has been shown to be </a:t>
+            </a:r>
+            <a:r>
+              <a:rPr lang="en-GB" altLang="en-US" sz="4600" b="1" dirty="0" smtClean="0"/>
+              <a:t>effective at mitigating the effects of stress</a:t>
+            </a:r>
+            <a:r>
+              <a:rPr lang="en-GB" altLang="en-US" sz="4600" dirty="0" smtClean="0"/>
+              <a:t>.</a:t>
+            </a:r>
+          </a:p>
+          <a:p>
+            <a:pPr lvl="2" algn="just">
+              <a:buFont typeface="Arial" panose="020B0604020202020204" pitchFamily="34" charset="0"/>
+              <a:buChar char="•"/>
+            </a:pPr>
+            <a:r>
+              <a:rPr lang="en-GB" altLang="en-US" sz="4600" dirty="0" smtClean="0"/>
+              <a:t>“Meditation is a safe and effective strategy for dealing with work stress.” (Black et. al., 2011)</a:t>
+            </a:r>
+          </a:p>
+          <a:p>
+            <a:pPr lvl="2" algn="just">
+              <a:buFont typeface="Arial" panose="020B0604020202020204" pitchFamily="34" charset="0"/>
+              <a:buChar char="•"/>
+            </a:pPr>
+            <a:r>
+              <a:rPr lang="en-US" altLang="en-US" sz="4600" dirty="0" smtClean="0"/>
+              <a:t>“Techniques </a:t>
+            </a:r>
+            <a:r>
+              <a:rPr lang="en-US" altLang="en-US" sz="4600" dirty="0"/>
+              <a:t>of mindfulness </a:t>
+            </a:r>
+            <a:r>
+              <a:rPr lang="en-US" altLang="en-US" sz="4600" dirty="0" smtClean="0"/>
+              <a:t>meditation may represent </a:t>
+            </a:r>
+            <a:r>
+              <a:rPr lang="en-US" altLang="en-US" sz="4600" dirty="0"/>
+              <a:t>a powerful cognitive </a:t>
+            </a:r>
+            <a:r>
+              <a:rPr lang="en-US" altLang="en-US" sz="4600" dirty="0" smtClean="0"/>
+              <a:t>behavioral </a:t>
+            </a:r>
+            <a:r>
+              <a:rPr lang="en-US" altLang="en-US" sz="4600" dirty="0"/>
+              <a:t>coping </a:t>
+            </a:r>
+            <a:r>
+              <a:rPr lang="en-US" altLang="en-US" sz="4600" dirty="0" smtClean="0"/>
+              <a:t>strategy.” (</a:t>
+            </a:r>
+            <a:r>
+              <a:rPr lang="en-US" altLang="en-US" sz="4600" dirty="0" err="1" smtClean="0"/>
+              <a:t>Astin</a:t>
+            </a:r>
+            <a:r>
+              <a:rPr lang="en-US" altLang="en-US" sz="4600" dirty="0" smtClean="0"/>
+              <a:t>, 1997)</a:t>
+            </a:r>
+            <a:endParaRPr lang="en-GB" altLang="en-US" sz="4600" dirty="0" smtClean="0"/>
           </a:p>
           <a:p>
             <a:pPr algn="just">
@@ -3788,58 +3865,42 @@
               <a:buChar char="•"/>
             </a:pPr>
             <a:r>
-              <a:rPr lang="en-GB" altLang="en-US" sz="4600" u="sng" dirty="0" smtClean="0"/>
+              <a:rPr lang="en-GB" altLang="en-US" sz="4600" dirty="0" smtClean="0"/>
               <a:t>An </a:t>
             </a:r>
             <a:r>
-              <a:rPr lang="en-GB" altLang="en-US" sz="4600" u="sng" dirty="0"/>
+              <a:rPr lang="en-GB" altLang="en-US" sz="4600" dirty="0"/>
               <a:t>app consisting of the </a:t>
             </a:r>
             <a:r>
-              <a:rPr lang="en-GB" altLang="en-US" sz="4600" u="sng" dirty="0" smtClean="0"/>
+              <a:rPr lang="en-GB" altLang="en-US" sz="4600" dirty="0" smtClean="0"/>
               <a:t>guided meditations player, </a:t>
             </a:r>
             <a:r>
-              <a:rPr lang="en-GB" altLang="en-US" sz="4600" u="sng" dirty="0"/>
+              <a:rPr lang="en-GB" altLang="en-US" sz="4600" dirty="0"/>
               <a:t>broken down into </a:t>
             </a:r>
             <a:r>
-              <a:rPr lang="en-GB" altLang="en-US" sz="4600" u="sng" dirty="0" smtClean="0"/>
+              <a:rPr lang="en-GB" altLang="en-US" sz="4600" dirty="0" smtClean="0"/>
               <a:t>sections </a:t>
             </a:r>
             <a:r>
-              <a:rPr lang="en-GB" altLang="en-US" sz="4600" u="sng" dirty="0"/>
+              <a:rPr lang="en-GB" altLang="en-US" sz="4600" dirty="0"/>
               <a:t>was developed by </a:t>
             </a:r>
             <a:r>
-              <a:rPr lang="en-GB" altLang="en-US" sz="4600" u="sng" dirty="0" smtClean="0"/>
+              <a:rPr lang="en-GB" altLang="en-US" sz="4600" dirty="0" smtClean="0"/>
               <a:t>1</a:t>
             </a:r>
             <a:r>
-              <a:rPr lang="en-GB" altLang="en-US" sz="4600" u="sng" baseline="30000" dirty="0" smtClean="0"/>
+              <a:rPr lang="en-GB" altLang="en-US" sz="4600" baseline="30000" dirty="0" smtClean="0"/>
               <a:t>st</a:t>
             </a:r>
             <a:r>
-              <a:rPr lang="en-GB" altLang="en-US" sz="4600" u="sng" dirty="0" smtClean="0"/>
-              <a:t> year CS students </a:t>
-            </a:r>
-            <a:r>
-              <a:rPr lang="en-GB" altLang="en-US" sz="4600" u="sng" dirty="0" smtClean="0"/>
-              <a:t>(Jaromir and Lambros), </a:t>
-            </a:r>
-            <a:r>
-              <a:rPr lang="en-GB" altLang="en-US" sz="4600" u="sng" dirty="0" smtClean="0"/>
-              <a:t>with a </a:t>
-            </a:r>
-            <a:r>
-              <a:rPr lang="en-GB" altLang="en-US" sz="4600" u="sng" dirty="0" smtClean="0"/>
-              <a:t>simple but intuitive </a:t>
-            </a:r>
-            <a:r>
-              <a:rPr lang="en-GB" altLang="en-US" sz="4600" u="sng" dirty="0" smtClean="0"/>
-              <a:t>user interface, trialled for User Experience by fellow UCL students.</a:t>
-            </a:r>
-            <a:endParaRPr lang="en-GB" altLang="en-US" sz="4600" u="sng" dirty="0"/>
+              <a:rPr lang="en-GB" altLang="en-US" sz="4600" dirty="0" smtClean="0"/>
+              <a:t> year CS students (Jaromir and Lambros), with a simple but intuitive user interface, trialled for User Experience by fellow UCL students.</a:t>
+            </a:r>
+            <a:endParaRPr lang="en-GB" altLang="en-US" sz="4600" dirty="0"/>
           </a:p>
           <a:p>
             <a:pPr algn="just">
@@ -3847,56 +3908,10 @@
               <a:buChar char="•"/>
             </a:pPr>
             <a:r>
-              <a:rPr lang="en-GB" altLang="en-US" sz="4600" u="sng" dirty="0"/>
-              <a:t>A built in </a:t>
-            </a:r>
-            <a:r>
-              <a:rPr lang="en-GB" altLang="en-US" sz="4600" b="1" u="sng" dirty="0"/>
-              <a:t>Nepali translation </a:t>
-            </a:r>
-            <a:r>
-              <a:rPr lang="en-GB" altLang="en-US" sz="4600" u="sng" dirty="0"/>
-              <a:t>was also </a:t>
-            </a:r>
-            <a:r>
-              <a:rPr lang="en-GB" altLang="en-US" sz="4600" u="sng" dirty="0" smtClean="0"/>
-              <a:t>included</a:t>
-            </a:r>
-            <a:r>
-              <a:rPr lang="en-GB" altLang="en-US" sz="4600" u="sng" dirty="0"/>
-              <a:t> </a:t>
-            </a:r>
-            <a:r>
-              <a:rPr lang="en-GB" altLang="en-US" sz="4600" u="sng" dirty="0" smtClean="0"/>
-              <a:t>to suit the interviewers (educated natives) and interviewers (possibly illiterate natives).</a:t>
-            </a:r>
-          </a:p>
-          <a:p>
-            <a:pPr algn="just">
-              <a:buFont typeface="Arial" panose="020B0604020202020204" pitchFamily="34" charset="0"/>
-              <a:buChar char="•"/>
-            </a:pPr>
-            <a:r>
-              <a:rPr lang="en-GB" altLang="en-US" sz="4600" u="sng" dirty="0" smtClean="0"/>
-              <a:t>The project also involved indirectly working for </a:t>
-            </a:r>
-            <a:r>
-              <a:rPr lang="en-GB" altLang="en-US" sz="4600" b="1" u="sng" dirty="0" smtClean="0"/>
-              <a:t>Save the Children </a:t>
-            </a:r>
-            <a:r>
-              <a:rPr lang="en-GB" altLang="en-US" sz="4600" u="sng" dirty="0" smtClean="0"/>
-              <a:t>and </a:t>
-            </a:r>
-            <a:r>
-              <a:rPr lang="en-GB" altLang="en-US" sz="4600" b="1" u="sng" dirty="0" smtClean="0"/>
-              <a:t>World Food Programme</a:t>
-            </a:r>
-            <a:r>
-              <a:rPr lang="en-GB" altLang="en-US" sz="4600" u="sng" dirty="0" smtClean="0"/>
-              <a:t>, who are responsible for several roles in the trial.</a:t>
-            </a:r>
-            <a:endParaRPr lang="en-GB" altLang="en-US" sz="4600" u="sng" dirty="0"/>
+              <a:rPr lang="en-GB" altLang="en-US" sz="4600" dirty="0" smtClean="0"/>
+              <a:t>The application involves multiple guided meditation tracks to make practicing easier, each of them involving binaural beats – tones of different frequencies influencing brain activity to induce positive effects.</a:t>
+            </a:r>
+            <a:endParaRPr lang="en-GB" altLang="en-US" sz="4600" dirty="0"/>
           </a:p>
           <a:p>
             <a:pPr algn="just">
@@ -3933,7 +3948,7 @@
             </a:pPr>
             <a:r>
               <a:rPr lang="en-GB" altLang="en-US" sz="4600" dirty="0" smtClean="0"/>
-              <a:t>Question from the cereals consumption sub-questionnaire.</a:t>
+              <a:t>Main menu of the application, hidden on the left side of the screen.</a:t>
             </a:r>
             <a:endParaRPr lang="en-GB" altLang="en-US" sz="4600" dirty="0"/>
           </a:p>
@@ -3944,7 +3959,7 @@
             </a:pPr>
             <a:r>
               <a:rPr lang="en-GB" altLang="en-US" sz="4600" dirty="0" smtClean="0"/>
-              <a:t>List of sub-questionnaires for the food consumption questionnaire, with progress bars to show level of completion.</a:t>
+              <a:t>List of all meditation tracks available along with their category.</a:t>
             </a:r>
             <a:endParaRPr lang="en-GB" altLang="en-US" sz="4600" dirty="0"/>
           </a:p>
@@ -3955,18 +3970,7 @@
             </a:pPr>
             <a:r>
               <a:rPr lang="en-GB" altLang="en-US" sz="4600" dirty="0" smtClean="0"/>
-              <a:t>Another question from a sub-questionnaire in Nepali.</a:t>
-            </a:r>
-            <a:endParaRPr lang="en-GB" altLang="en-US" sz="4600" dirty="0"/>
-          </a:p>
-          <a:p>
-            <a:pPr lvl="2" algn="just">
-              <a:buFont typeface="Courier New" panose="02070309020205020404" pitchFamily="49" charset="0"/>
-              <a:buChar char="o"/>
-            </a:pPr>
-            <a:r>
-              <a:rPr lang="en-GB" altLang="en-US" sz="4600" dirty="0" smtClean="0"/>
-              <a:t>Shows the attributes for a saved member of a family.</a:t>
+              <a:t>Meditation player with track loaded.</a:t>
             </a:r>
             <a:endParaRPr lang="en-GB" altLang="en-US" sz="4600" dirty="0"/>
           </a:p>
@@ -3983,44 +3987,8 @@
               <a:buChar char="•"/>
             </a:pPr>
             <a:r>
-              <a:rPr lang="en-GB" altLang="en-US" sz="6000" b="1" dirty="0"/>
-              <a:t>As of 23</a:t>
-            </a:r>
-            <a:r>
-              <a:rPr lang="en-GB" altLang="en-US" sz="6000" b="1" baseline="30000" dirty="0"/>
-              <a:t>rd</a:t>
-            </a:r>
-            <a:r>
-              <a:rPr lang="en-GB" altLang="en-US" sz="6000" b="1" dirty="0"/>
-              <a:t> </a:t>
-            </a:r>
-            <a:r>
               <a:rPr lang="en-GB" altLang="en-US" sz="6000" b="1" dirty="0" smtClean="0"/>
-              <a:t>April </a:t>
-            </a:r>
-            <a:r>
-              <a:rPr lang="en-GB" altLang="en-US" sz="6000" b="1" dirty="0"/>
-              <a:t>the app is </a:t>
-            </a:r>
-            <a:r>
-              <a:rPr lang="en-GB" altLang="en-US" sz="6000" b="1" dirty="0" smtClean="0"/>
-              <a:t>now deployed and in use by researchers for data collection in the field</a:t>
-            </a:r>
-            <a:r>
-              <a:rPr lang="en-GB" altLang="en-US" sz="6000" b="1" dirty="0"/>
-              <a:t> </a:t>
-            </a:r>
-            <a:r>
-              <a:rPr lang="en-GB" altLang="en-US" sz="6000" b="1" dirty="0" smtClean="0"/>
-              <a:t>in Nepal, </a:t>
-            </a:r>
-            <a:r>
-              <a:rPr lang="en-GB" altLang="en-US" sz="6000" b="1" dirty="0"/>
-              <a:t>from UCL’s Institute for Global </a:t>
-            </a:r>
-            <a:r>
-              <a:rPr lang="en-GB" altLang="en-US" sz="6000" b="1" dirty="0" smtClean="0"/>
-              <a:t>Health. The data analysis will be presented in a publication study.</a:t>
+              <a:t>The application is about to be published for Android on Google Play Store, iOS launch is planned for the second version, involving in-app purchases as well.</a:t>
             </a:r>
             <a:endParaRPr lang="en-GB" altLang="en-US" sz="6000" b="1" dirty="0"/>
           </a:p>

</xml_diff>

<commit_message>
polished poster and finished feedback in final report
</commit_message>
<xml_diff>
--- a/Documents/team52_final_poster.pptx
+++ b/Documents/team52_final_poster.pptx
@@ -251,7 +251,7 @@
               <a:pPr>
                 <a:defRPr/>
               </a:pPr>
-              <a:t>11/04/2016</a:t>
+              <a:t>12/04/2016</a:t>
             </a:fld>
             <a:endParaRPr lang="en-GB"/>
           </a:p>
@@ -3937,7 +3937,11 @@
             </a:pPr>
             <a:r>
               <a:rPr lang="en-GB" altLang="en-US" sz="4600" dirty="0" smtClean="0"/>
-              <a:t>Designing the application from scratch.</a:t>
+              <a:t>Main </a:t>
+            </a:r>
+            <a:r>
+              <a:rPr lang="en-GB" altLang="en-US" sz="4600" dirty="0" smtClean="0"/>
+              <a:t>menu of the application, hidden on the left side of the screen.</a:t>
             </a:r>
             <a:endParaRPr lang="en-GB" altLang="en-US" sz="4600" dirty="0"/>
           </a:p>
@@ -3948,7 +3952,7 @@
             </a:pPr>
             <a:r>
               <a:rPr lang="en-GB" altLang="en-US" sz="4600" dirty="0" smtClean="0"/>
-              <a:t>Main menu of the application, hidden on the left side of the screen.</a:t>
+              <a:t>List of all meditation tracks available along with their category.</a:t>
             </a:r>
             <a:endParaRPr lang="en-GB" altLang="en-US" sz="4600" dirty="0"/>
           </a:p>
@@ -3959,9 +3963,12 @@
             </a:pPr>
             <a:r>
               <a:rPr lang="en-GB" altLang="en-US" sz="4600" dirty="0" smtClean="0"/>
-              <a:t>List of all meditation tracks available along with their category.</a:t>
-            </a:r>
-            <a:endParaRPr lang="en-GB" altLang="en-US" sz="4600" dirty="0"/>
+              <a:t>Meditation player with track loaded</a:t>
+            </a:r>
+            <a:r>
+              <a:rPr lang="en-GB" altLang="en-US" sz="4600" dirty="0" smtClean="0"/>
+              <a:t>.</a:t>
+            </a:r>
           </a:p>
           <a:p>
             <a:pPr lvl="2" algn="just">
@@ -3970,7 +3977,11 @@
             </a:pPr>
             <a:r>
               <a:rPr lang="en-GB" altLang="en-US" sz="4600" dirty="0" smtClean="0"/>
-              <a:t>Meditation player with track loaded.</a:t>
+              <a:t>Real-time analytics for profiling success and </a:t>
+            </a:r>
+            <a:r>
+              <a:rPr lang="en-GB" altLang="en-US" sz="4600" smtClean="0"/>
+              <a:t>user behaviour.</a:t>
             </a:r>
             <a:endParaRPr lang="en-GB" altLang="en-US" sz="4600" dirty="0"/>
           </a:p>
@@ -4016,7 +4027,7 @@
         </p:blipFill>
         <p:spPr>
           <a:xfrm>
-            <a:off x="22313624" y="18596371"/>
+            <a:off x="22280856" y="8840097"/>
             <a:ext cx="5657850" cy="10058400"/>
           </a:xfrm>
           <a:prstGeom prst="rect">
@@ -4046,7 +4057,7 @@
         </p:blipFill>
         <p:spPr>
           <a:xfrm>
-            <a:off x="29362000" y="18596371"/>
+            <a:off x="29225582" y="8840097"/>
             <a:ext cx="5657850" cy="10058400"/>
           </a:xfrm>
           <a:prstGeom prst="rect">
@@ -4076,7 +4087,7 @@
         </p:blipFill>
         <p:spPr>
           <a:xfrm>
-            <a:off x="36410376" y="18596371"/>
+            <a:off x="36051820" y="8840097"/>
             <a:ext cx="5657850" cy="10058400"/>
           </a:xfrm>
           <a:prstGeom prst="rect">
@@ -4086,7 +4097,7 @@
       </p:pic>
       <p:pic>
         <p:nvPicPr>
-          <p:cNvPr id="8" name="Picture 7"/>
+          <p:cNvPr id="2" name="Picture 1"/>
           <p:cNvPicPr>
             <a:picLocks noChangeAspect="1"/>
           </p:cNvPicPr>
@@ -4106,8 +4117,8 @@
         </p:blipFill>
         <p:spPr>
           <a:xfrm>
-            <a:off x="21260246" y="8923337"/>
-            <a:ext cx="21861358" cy="8719746"/>
+            <a:off x="22280856" y="19059606"/>
+            <a:ext cx="19428814" cy="10923373"/>
           </a:xfrm>
           <a:prstGeom prst="rect">
             <a:avLst/>

</xml_diff>

<commit_message>
final changes to the final report
</commit_message>
<xml_diff>
--- a/Documents/team52_final_poster.pptx
+++ b/Documents/team52_final_poster.pptx
@@ -251,7 +251,7 @@
               <a:pPr>
                 <a:defRPr/>
               </a:pPr>
-              <a:t>12/04/2016</a:t>
+              <a:t>17/04/2016</a:t>
             </a:fld>
             <a:endParaRPr lang="en-GB"/>
           </a:p>
@@ -3813,7 +3813,23 @@
             </a:pPr>
             <a:r>
               <a:rPr lang="en-GB" altLang="en-US" sz="4600" dirty="0" smtClean="0"/>
-              <a:t>“Meditation is a safe and effective strategy for dealing with work stress.” (Black et. al., 2011)</a:t>
+              <a:t>“Meditation is a safe and </a:t>
+            </a:r>
+            <a:r>
+              <a:rPr lang="en-GB" altLang="en-US" sz="4600" b="1" dirty="0" smtClean="0"/>
+              <a:t>effective</a:t>
+            </a:r>
+            <a:r>
+              <a:rPr lang="en-GB" altLang="en-US" sz="4600" dirty="0" smtClean="0"/>
+              <a:t> strategy </a:t>
+            </a:r>
+            <a:r>
+              <a:rPr lang="en-GB" altLang="en-US" sz="4600" b="1" dirty="0" smtClean="0"/>
+              <a:t>for dealing with work stress</a:t>
+            </a:r>
+            <a:r>
+              <a:rPr lang="en-GB" altLang="en-US" sz="4600" dirty="0" smtClean="0"/>
+              <a:t>.” (Black et. al., 2011)</a:t>
             </a:r>
           </a:p>
           <a:p>
@@ -3830,24 +3846,36 @@
               <a:t>of mindfulness </a:t>
             </a:r>
             <a:r>
+              <a:rPr lang="en-US" altLang="en-US" sz="4600" b="1" dirty="0" smtClean="0"/>
+              <a:t>meditation</a:t>
+            </a:r>
+            <a:r>
               <a:rPr lang="en-US" altLang="en-US" sz="4600" dirty="0" smtClean="0"/>
-              <a:t>meditation may represent </a:t>
+              <a:t> may represent </a:t>
             </a:r>
             <a:r>
               <a:rPr lang="en-US" altLang="en-US" sz="4600" dirty="0"/>
-              <a:t>a powerful cognitive </a:t>
+              <a:t>a </a:t>
+            </a:r>
+            <a:r>
+              <a:rPr lang="en-US" altLang="en-US" sz="4600" b="1" dirty="0"/>
+              <a:t>powerful cognitive </a:t>
+            </a:r>
+            <a:r>
+              <a:rPr lang="en-US" altLang="en-US" sz="4600" b="1" dirty="0" smtClean="0"/>
+              <a:t>behavioral </a:t>
+            </a:r>
+            <a:r>
+              <a:rPr lang="en-US" altLang="en-US" sz="4600" b="1" dirty="0"/>
+              <a:t>coping </a:t>
+            </a:r>
+            <a:r>
+              <a:rPr lang="en-US" altLang="en-US" sz="4600" b="1" dirty="0" smtClean="0"/>
+              <a:t>strategy</a:t>
             </a:r>
             <a:r>
               <a:rPr lang="en-US" altLang="en-US" sz="4600" dirty="0" smtClean="0"/>
-              <a:t>behavioral </a:t>
-            </a:r>
-            <a:r>
-              <a:rPr lang="en-US" altLang="en-US" sz="4600" dirty="0"/>
-              <a:t>coping </a:t>
-            </a:r>
-            <a:r>
-              <a:rPr lang="en-US" altLang="en-US" sz="4600" dirty="0" smtClean="0"/>
-              <a:t>strategy.” (</a:t>
+              <a:t>.” (</a:t>
             </a:r>
             <a:r>
               <a:rPr lang="en-US" altLang="en-US" sz="4600" dirty="0" err="1" smtClean="0"/>
@@ -3937,11 +3965,7 @@
             </a:pPr>
             <a:r>
               <a:rPr lang="en-GB" altLang="en-US" sz="4600" dirty="0" smtClean="0"/>
-              <a:t>Main </a:t>
-            </a:r>
-            <a:r>
-              <a:rPr lang="en-GB" altLang="en-US" sz="4600" dirty="0" smtClean="0"/>
-              <a:t>menu of the application, hidden on the left side of the screen.</a:t>
+              <a:t>Main menu of the application, hidden on the left side of the screen.</a:t>
             </a:r>
             <a:endParaRPr lang="en-GB" altLang="en-US" sz="4600" dirty="0"/>
           </a:p>
@@ -3963,11 +3987,19 @@
             </a:pPr>
             <a:r>
               <a:rPr lang="en-GB" altLang="en-US" sz="4600" dirty="0" smtClean="0"/>
-              <a:t>Meditation player with track loaded</a:t>
+              <a:t>Meditation player with </a:t>
+            </a:r>
+            <a:r>
+              <a:rPr lang="en-GB" altLang="en-US" sz="4600" smtClean="0"/>
+              <a:t>a meditation</a:t>
+            </a:r>
+            <a:r>
+              <a:rPr lang="en-GB" altLang="en-US" sz="4600" smtClean="0"/>
+              <a:t> </a:t>
             </a:r>
             <a:r>
               <a:rPr lang="en-GB" altLang="en-US" sz="4600" dirty="0" smtClean="0"/>
-              <a:t>.</a:t>
+              <a:t>loaded.</a:t>
             </a:r>
           </a:p>
           <a:p>
@@ -3977,11 +4009,7 @@
             </a:pPr>
             <a:r>
               <a:rPr lang="en-GB" altLang="en-US" sz="4600" dirty="0" smtClean="0"/>
-              <a:t>Real-time analytics for profiling success and </a:t>
-            </a:r>
-            <a:r>
-              <a:rPr lang="en-GB" altLang="en-US" sz="4600" smtClean="0"/>
-              <a:t>user behaviour.</a:t>
+              <a:t>Real-time analytics for profiling success and user behaviour.</a:t>
             </a:r>
             <a:endParaRPr lang="en-GB" altLang="en-US" sz="4600" dirty="0"/>
           </a:p>

</xml_diff>